<commit_message>
Update figures with beta_jan25
</commit_message>
<xml_diff>
--- a/figures/dist_test.pptx
+++ b/figures/dist_test.pptx
@@ -104,6 +104,11 @@
       </a:defRPr>
     </a:lvl9pPr>
   </p:defaultTextStyle>
+  <p:extLst>
+    <p:ext uri="{EFAFB233-063F-42B5-8137-9DF3F51BA10A}">
+      <p15:sldGuideLst xmlns:p15="http://schemas.microsoft.com/office/powerpoint/2012/main"/>
+    </p:ext>
+  </p:extLst>
 </p:presentation>
 </file>
 
@@ -238,7 +243,7 @@
           <a:p>
             <a:fld id="{C231340E-FD15-BC43-AB1D-46E0F7DA9FB0}" type="datetimeFigureOut">
               <a:rPr lang="en-US" smtClean="0"/>
-              <a:t>4/15/25</a:t>
+              <a:t>5/26/25</a:t>
             </a:fld>
             <a:endParaRPr lang="en-US"/>
           </a:p>
@@ -408,7 +413,7 @@
           <a:p>
             <a:fld id="{C231340E-FD15-BC43-AB1D-46E0F7DA9FB0}" type="datetimeFigureOut">
               <a:rPr lang="en-US" smtClean="0"/>
-              <a:t>4/15/25</a:t>
+              <a:t>5/26/25</a:t>
             </a:fld>
             <a:endParaRPr lang="en-US"/>
           </a:p>
@@ -588,7 +593,7 @@
           <a:p>
             <a:fld id="{C231340E-FD15-BC43-AB1D-46E0F7DA9FB0}" type="datetimeFigureOut">
               <a:rPr lang="en-US" smtClean="0"/>
-              <a:t>4/15/25</a:t>
+              <a:t>5/26/25</a:t>
             </a:fld>
             <a:endParaRPr lang="en-US"/>
           </a:p>
@@ -758,7 +763,7 @@
           <a:p>
             <a:fld id="{C231340E-FD15-BC43-AB1D-46E0F7DA9FB0}" type="datetimeFigureOut">
               <a:rPr lang="en-US" smtClean="0"/>
-              <a:t>4/15/25</a:t>
+              <a:t>5/26/25</a:t>
             </a:fld>
             <a:endParaRPr lang="en-US"/>
           </a:p>
@@ -1004,7 +1009,7 @@
           <a:p>
             <a:fld id="{C231340E-FD15-BC43-AB1D-46E0F7DA9FB0}" type="datetimeFigureOut">
               <a:rPr lang="en-US" smtClean="0"/>
-              <a:t>4/15/25</a:t>
+              <a:t>5/26/25</a:t>
             </a:fld>
             <a:endParaRPr lang="en-US"/>
           </a:p>
@@ -1236,7 +1241,7 @@
           <a:p>
             <a:fld id="{C231340E-FD15-BC43-AB1D-46E0F7DA9FB0}" type="datetimeFigureOut">
               <a:rPr lang="en-US" smtClean="0"/>
-              <a:t>4/15/25</a:t>
+              <a:t>5/26/25</a:t>
             </a:fld>
             <a:endParaRPr lang="en-US"/>
           </a:p>
@@ -1603,7 +1608,7 @@
           <a:p>
             <a:fld id="{C231340E-FD15-BC43-AB1D-46E0F7DA9FB0}" type="datetimeFigureOut">
               <a:rPr lang="en-US" smtClean="0"/>
-              <a:t>4/15/25</a:t>
+              <a:t>5/26/25</a:t>
             </a:fld>
             <a:endParaRPr lang="en-US"/>
           </a:p>
@@ -1721,7 +1726,7 @@
           <a:p>
             <a:fld id="{C231340E-FD15-BC43-AB1D-46E0F7DA9FB0}" type="datetimeFigureOut">
               <a:rPr lang="en-US" smtClean="0"/>
-              <a:t>4/15/25</a:t>
+              <a:t>5/26/25</a:t>
             </a:fld>
             <a:endParaRPr lang="en-US"/>
           </a:p>
@@ -1816,7 +1821,7 @@
           <a:p>
             <a:fld id="{C231340E-FD15-BC43-AB1D-46E0F7DA9FB0}" type="datetimeFigureOut">
               <a:rPr lang="en-US" smtClean="0"/>
-              <a:t>4/15/25</a:t>
+              <a:t>5/26/25</a:t>
             </a:fld>
             <a:endParaRPr lang="en-US"/>
           </a:p>
@@ -2093,7 +2098,7 @@
           <a:p>
             <a:fld id="{C231340E-FD15-BC43-AB1D-46E0F7DA9FB0}" type="datetimeFigureOut">
               <a:rPr lang="en-US" smtClean="0"/>
-              <a:t>4/15/25</a:t>
+              <a:t>5/26/25</a:t>
             </a:fld>
             <a:endParaRPr lang="en-US"/>
           </a:p>
@@ -2350,7 +2355,7 @@
           <a:p>
             <a:fld id="{C231340E-FD15-BC43-AB1D-46E0F7DA9FB0}" type="datetimeFigureOut">
               <a:rPr lang="en-US" smtClean="0"/>
-              <a:t>4/15/25</a:t>
+              <a:t>5/26/25</a:t>
             </a:fld>
             <a:endParaRPr lang="en-US"/>
           </a:p>
@@ -2563,7 +2568,7 @@
           <a:p>
             <a:fld id="{C231340E-FD15-BC43-AB1D-46E0F7DA9FB0}" type="datetimeFigureOut">
               <a:rPr lang="en-US" smtClean="0"/>
-              <a:t>4/15/25</a:t>
+              <a:t>5/26/25</a:t>
             </a:fld>
             <a:endParaRPr lang="en-US"/>
           </a:p>
@@ -3488,7 +3493,7 @@
           </p:cNvPicPr>
           <p:nvPr/>
         </p:nvPicPr>
-        <p:blipFill>
+        <p:blipFill rotWithShape="1">
           <a:blip r:embed="rId4">
             <a:extLst>
               <a:ext uri="{28A0092B-C50C-407E-A947-70E740481C1C}">
@@ -3496,15 +3501,15 @@
               </a:ext>
             </a:extLst>
           </a:blip>
-          <a:srcRect/>
+          <a:srcRect t="9550"/>
           <a:stretch>
             <a:fillRect/>
           </a:stretch>
         </p:blipFill>
         <p:spPr bwMode="auto">
           <a:xfrm>
-            <a:off x="76231" y="1670536"/>
-            <a:ext cx="2909427" cy="1602458"/>
+            <a:off x="76231" y="1823346"/>
+            <a:ext cx="2905327" cy="1447389"/>
           </a:xfrm>
           <a:prstGeom prst="rect">
             <a:avLst/>
@@ -3535,7 +3540,7 @@
           </p:cNvPicPr>
           <p:nvPr/>
         </p:nvPicPr>
-        <p:blipFill>
+        <p:blipFill rotWithShape="1">
           <a:blip r:embed="rId5">
             <a:extLst>
               <a:ext uri="{28A0092B-C50C-407E-A947-70E740481C1C}">
@@ -3543,15 +3548,15 @@
               </a:ext>
             </a:extLst>
           </a:blip>
-          <a:srcRect/>
+          <a:srcRect t="9536"/>
           <a:stretch>
             <a:fillRect/>
           </a:stretch>
         </p:blipFill>
         <p:spPr bwMode="auto">
           <a:xfrm>
-            <a:off x="3243802" y="1670536"/>
-            <a:ext cx="2909427" cy="1602458"/>
+            <a:off x="3243802" y="1823346"/>
+            <a:ext cx="2909427" cy="1449648"/>
           </a:xfrm>
           <a:prstGeom prst="rect">
             <a:avLst/>
@@ -3762,7 +3767,7 @@
                 <a:latin typeface="Arial" panose="020B0604020202020204" pitchFamily="34" charset="0"/>
                 <a:cs typeface="Arial" panose="020B0604020202020204" pitchFamily="34" charset="0"/>
               </a:rPr>
-              <a:t>beta_jan22</a:t>
+              <a:t>beta_jan25</a:t>
             </a:r>
           </a:p>
         </p:txBody>
@@ -3844,7 +3849,85 @@
                 <a:latin typeface="Arial" panose="020B0604020202020204" pitchFamily="34" charset="0"/>
                 <a:cs typeface="Arial" panose="020B0604020202020204" pitchFamily="34" charset="0"/>
               </a:rPr>
-              <a:t>beta_jan22</a:t>
+              <a:t>beta_jan25</a:t>
+            </a:r>
+          </a:p>
+        </p:txBody>
+      </p:sp>
+      <p:sp>
+        <p:nvSpPr>
+          <p:cNvPr id="2" name="TextBox 1">
+            <a:extLst>
+              <a:ext uri="{FF2B5EF4-FFF2-40B4-BE49-F238E27FC236}">
+                <a16:creationId xmlns:a16="http://schemas.microsoft.com/office/drawing/2014/main" id="{2A072B60-59C4-5925-019F-3498A8B70340}"/>
+              </a:ext>
+            </a:extLst>
+          </p:cNvPr>
+          <p:cNvSpPr txBox="1"/>
+          <p:nvPr/>
+        </p:nvSpPr>
+        <p:spPr>
+          <a:xfrm>
+            <a:off x="3552374" y="1622205"/>
+            <a:ext cx="2521855" cy="230832"/>
+          </a:xfrm>
+          <a:prstGeom prst="rect">
+            <a:avLst/>
+          </a:prstGeom>
+          <a:noFill/>
+        </p:spPr>
+        <p:txBody>
+          <a:bodyPr wrap="square" rtlCol="0">
+            <a:spAutoFit/>
+          </a:bodyPr>
+          <a:lstStyle/>
+          <a:p>
+            <a:pPr algn="ctr"/>
+            <a:r>
+              <a:rPr lang="en-US" sz="900" dirty="0">
+                <a:latin typeface="Arial" panose="020B0604020202020204" pitchFamily="34" charset="0"/>
+                <a:cs typeface="Arial" panose="020B0604020202020204" pitchFamily="34" charset="0"/>
+              </a:rPr>
+              <a:t>beta_jan25</a:t>
+            </a:r>
+          </a:p>
+        </p:txBody>
+      </p:sp>
+      <p:sp>
+        <p:nvSpPr>
+          <p:cNvPr id="3" name="TextBox 2">
+            <a:extLst>
+              <a:ext uri="{FF2B5EF4-FFF2-40B4-BE49-F238E27FC236}">
+                <a16:creationId xmlns:a16="http://schemas.microsoft.com/office/drawing/2014/main" id="{E19F0F26-FEE8-01BD-6951-F9BBADEC48F4}"/>
+              </a:ext>
+            </a:extLst>
+          </p:cNvPr>
+          <p:cNvSpPr txBox="1"/>
+          <p:nvPr/>
+        </p:nvSpPr>
+        <p:spPr>
+          <a:xfrm>
+            <a:off x="374087" y="1623424"/>
+            <a:ext cx="2521855" cy="230832"/>
+          </a:xfrm>
+          <a:prstGeom prst="rect">
+            <a:avLst/>
+          </a:prstGeom>
+          <a:noFill/>
+        </p:spPr>
+        <p:txBody>
+          <a:bodyPr wrap="square" rtlCol="0">
+            <a:spAutoFit/>
+          </a:bodyPr>
+          <a:lstStyle/>
+          <a:p>
+            <a:pPr algn="ctr"/>
+            <a:r>
+              <a:rPr lang="en-US" sz="900" dirty="0">
+                <a:latin typeface="Arial" panose="020B0604020202020204" pitchFamily="34" charset="0"/>
+                <a:cs typeface="Arial" panose="020B0604020202020204" pitchFamily="34" charset="0"/>
+              </a:rPr>
+              <a:t>beta_nov16</a:t>
             </a:r>
           </a:p>
         </p:txBody>

</xml_diff>